<commit_message>
I'm thankful to serve you
</commit_message>
<xml_diff>
--- a/branch.pptx
+++ b/branch.pptx
@@ -263,7 +263,7 @@
           <a:p>
             <a:fld id="{42AB81E2-2E7B-B344-9159-A676E4F74E42}" type="datetimeFigureOut">
               <a:rPr lang="en-KR" smtClean="0"/>
-              <a:t>1/11/24</a:t>
+              <a:t>01/11/2024</a:t>
             </a:fld>
             <a:endParaRPr lang="en-KR"/>
           </a:p>
@@ -463,7 +463,7 @@
           <a:p>
             <a:fld id="{42AB81E2-2E7B-B344-9159-A676E4F74E42}" type="datetimeFigureOut">
               <a:rPr lang="en-KR" smtClean="0"/>
-              <a:t>1/11/24</a:t>
+              <a:t>01/11/2024</a:t>
             </a:fld>
             <a:endParaRPr lang="en-KR"/>
           </a:p>
@@ -673,7 +673,7 @@
           <a:p>
             <a:fld id="{42AB81E2-2E7B-B344-9159-A676E4F74E42}" type="datetimeFigureOut">
               <a:rPr lang="en-KR" smtClean="0"/>
-              <a:t>1/11/24</a:t>
+              <a:t>01/11/2024</a:t>
             </a:fld>
             <a:endParaRPr lang="en-KR"/>
           </a:p>
@@ -873,7 +873,7 @@
           <a:p>
             <a:fld id="{42AB81E2-2E7B-B344-9159-A676E4F74E42}" type="datetimeFigureOut">
               <a:rPr lang="en-KR" smtClean="0"/>
-              <a:t>1/11/24</a:t>
+              <a:t>01/11/2024</a:t>
             </a:fld>
             <a:endParaRPr lang="en-KR"/>
           </a:p>
@@ -1149,7 +1149,7 @@
           <a:p>
             <a:fld id="{42AB81E2-2E7B-B344-9159-A676E4F74E42}" type="datetimeFigureOut">
               <a:rPr lang="en-KR" smtClean="0"/>
-              <a:t>1/11/24</a:t>
+              <a:t>01/11/2024</a:t>
             </a:fld>
             <a:endParaRPr lang="en-KR"/>
           </a:p>
@@ -1417,7 +1417,7 @@
           <a:p>
             <a:fld id="{42AB81E2-2E7B-B344-9159-A676E4F74E42}" type="datetimeFigureOut">
               <a:rPr lang="en-KR" smtClean="0"/>
-              <a:t>1/11/24</a:t>
+              <a:t>01/11/2024</a:t>
             </a:fld>
             <a:endParaRPr lang="en-KR"/>
           </a:p>
@@ -1832,7 +1832,7 @@
           <a:p>
             <a:fld id="{42AB81E2-2E7B-B344-9159-A676E4F74E42}" type="datetimeFigureOut">
               <a:rPr lang="en-KR" smtClean="0"/>
-              <a:t>1/11/24</a:t>
+              <a:t>01/11/2024</a:t>
             </a:fld>
             <a:endParaRPr lang="en-KR"/>
           </a:p>
@@ -1974,7 +1974,7 @@
           <a:p>
             <a:fld id="{42AB81E2-2E7B-B344-9159-A676E4F74E42}" type="datetimeFigureOut">
               <a:rPr lang="en-KR" smtClean="0"/>
-              <a:t>1/11/24</a:t>
+              <a:t>01/11/2024</a:t>
             </a:fld>
             <a:endParaRPr lang="en-KR"/>
           </a:p>
@@ -2087,7 +2087,7 @@
           <a:p>
             <a:fld id="{42AB81E2-2E7B-B344-9159-A676E4F74E42}" type="datetimeFigureOut">
               <a:rPr lang="en-KR" smtClean="0"/>
-              <a:t>1/11/24</a:t>
+              <a:t>01/11/2024</a:t>
             </a:fld>
             <a:endParaRPr lang="en-KR"/>
           </a:p>
@@ -2400,7 +2400,7 @@
           <a:p>
             <a:fld id="{42AB81E2-2E7B-B344-9159-A676E4F74E42}" type="datetimeFigureOut">
               <a:rPr lang="en-KR" smtClean="0"/>
-              <a:t>1/11/24</a:t>
+              <a:t>01/11/2024</a:t>
             </a:fld>
             <a:endParaRPr lang="en-KR"/>
           </a:p>
@@ -2689,7 +2689,7 @@
           <a:p>
             <a:fld id="{42AB81E2-2E7B-B344-9159-A676E4F74E42}" type="datetimeFigureOut">
               <a:rPr lang="en-KR" smtClean="0"/>
-              <a:t>1/11/24</a:t>
+              <a:t>01/11/2024</a:t>
             </a:fld>
             <a:endParaRPr lang="en-KR"/>
           </a:p>
@@ -2932,7 +2932,7 @@
           <a:p>
             <a:fld id="{42AB81E2-2E7B-B344-9159-A676E4F74E42}" type="datetimeFigureOut">
               <a:rPr lang="en-KR" smtClean="0"/>
-              <a:t>1/11/24</a:t>
+              <a:t>01/11/2024</a:t>
             </a:fld>
             <a:endParaRPr lang="en-KR"/>
           </a:p>
@@ -3365,7 +3365,7 @@
                 <a16:creationId xmlns:a16="http://schemas.microsoft.com/office/drawing/2014/main" id="{934F1179-B481-4F9E-BCA3-AFB972070F83}"/>
               </a:ext>
               <a:ext uri="{C183D7F6-B498-43B3-948B-1728B52AA6E4}">
-                <adec:decorative xmlns:adec="http://schemas.microsoft.com/office/drawing/2017/decorative" val="1"/>
+                <adec:decorative xmlns:adec="http://schemas.microsoft.com/office/drawing/2017/decorative" xmlns="" val="1"/>
               </a:ext>
             </a:extLst>
           </p:cNvPr>
@@ -3425,7 +3425,7 @@
                 <a16:creationId xmlns:a16="http://schemas.microsoft.com/office/drawing/2014/main" id="{827DC2C4-B485-428A-BF4A-472D2967F47F}"/>
               </a:ext>
               <a:ext uri="{C183D7F6-B498-43B3-948B-1728B52AA6E4}">
-                <adec:decorative xmlns:adec="http://schemas.microsoft.com/office/drawing/2017/decorative" val="1"/>
+                <adec:decorative xmlns:adec="http://schemas.microsoft.com/office/drawing/2017/decorative" xmlns="" val="1"/>
               </a:ext>
             </a:extLst>
           </p:cNvPr>
@@ -3488,7 +3488,7 @@
                 <a16:creationId xmlns:a16="http://schemas.microsoft.com/office/drawing/2014/main" id="{EE04B5EB-F158-4507-90DD-BD23620C7CC9}"/>
               </a:ext>
               <a:ext uri="{C183D7F6-B498-43B3-948B-1728B52AA6E4}">
-                <adec:decorative xmlns:adec="http://schemas.microsoft.com/office/drawing/2017/decorative" val="1"/>
+                <adec:decorative xmlns:adec="http://schemas.microsoft.com/office/drawing/2017/decorative" xmlns="" val="1"/>
               </a:ext>
             </a:extLst>
           </p:cNvPr>
@@ -3620,6 +3620,46 @@
           </a:p>
         </p:txBody>
       </p:sp>
+      <p:sp>
+        <p:nvSpPr>
+          <p:cNvPr id="4" name="직사각형 3"/>
+          <p:cNvSpPr/>
+          <p:nvPr/>
+        </p:nvSpPr>
+        <p:spPr>
+          <a:xfrm>
+            <a:off x="9694249" y="4002609"/>
+            <a:ext cx="1450110" cy="1496291"/>
+          </a:xfrm>
+          <a:prstGeom prst="rect">
+            <a:avLst/>
+          </a:prstGeom>
+        </p:spPr>
+        <p:style>
+          <a:lnRef idx="2">
+            <a:schemeClr val="accent1">
+              <a:shade val="50000"/>
+            </a:schemeClr>
+          </a:lnRef>
+          <a:fillRef idx="1">
+            <a:schemeClr val="accent1"/>
+          </a:fillRef>
+          <a:effectRef idx="0">
+            <a:schemeClr val="accent1"/>
+          </a:effectRef>
+          <a:fontRef idx="minor">
+            <a:schemeClr val="lt1"/>
+          </a:fontRef>
+        </p:style>
+        <p:txBody>
+          <a:bodyPr rtlCol="0" anchor="ctr"/>
+          <a:lstStyle/>
+          <a:p>
+            <a:pPr algn="ctr"/>
+            <a:endParaRPr lang="ko-KR" altLang="en-US"/>
+          </a:p>
+        </p:txBody>
+      </p:sp>
     </p:spTree>
     <p:extLst>
       <p:ext uri="{BB962C8B-B14F-4D97-AF65-F5344CB8AC3E}">
@@ -3630,6 +3670,13 @@
   <p:clrMapOvr>
     <a:masterClrMapping/>
   </p:clrMapOvr>
+  <p:timing>
+    <p:tnLst>
+      <p:par>
+        <p:cTn id="1" dur="indefinite" restart="never" nodeType="tmRoot"/>
+      </p:par>
+    </p:tnLst>
+  </p:timing>
 </p:sld>
 </file>
 

</xml_diff>